<commit_message>
added questions and slides for online exams and classes
</commit_message>
<xml_diff>
--- a/SPRING 20/CSE 101/Course Materials/algo_pseudo_flowcharts_part3.pptx
+++ b/SPRING 20/CSE 101/Course Materials/algo_pseudo_flowcharts_part3.pptx
@@ -346,7 +346,7 @@
           <a:p>
             <a:fld id="{2C94F50C-06F8-4A2E-ABC3-4E06C1913EFD}" type="datetimeFigureOut">
               <a:rPr lang="en-SG" smtClean="0"/>
-              <a:t>17/3/2020</a:t>
+              <a:t>18/3/2020</a:t>
             </a:fld>
             <a:endParaRPr lang="en-SG"/>
           </a:p>
@@ -642,7 +642,7 @@
           <a:p>
             <a:fld id="{2C94F50C-06F8-4A2E-ABC3-4E06C1913EFD}" type="datetimeFigureOut">
               <a:rPr lang="en-SG" smtClean="0"/>
-              <a:t>17/3/2020</a:t>
+              <a:t>18/3/2020</a:t>
             </a:fld>
             <a:endParaRPr lang="en-SG"/>
           </a:p>
@@ -901,7 +901,7 @@
           <a:p>
             <a:fld id="{2C94F50C-06F8-4A2E-ABC3-4E06C1913EFD}" type="datetimeFigureOut">
               <a:rPr lang="en-SG" smtClean="0"/>
-              <a:t>17/3/2020</a:t>
+              <a:t>18/3/2020</a:t>
             </a:fld>
             <a:endParaRPr lang="en-SG"/>
           </a:p>
@@ -1370,7 +1370,7 @@
           <a:p>
             <a:fld id="{2C94F50C-06F8-4A2E-ABC3-4E06C1913EFD}" type="datetimeFigureOut">
               <a:rPr lang="en-SG" smtClean="0"/>
-              <a:t>17/3/2020</a:t>
+              <a:t>18/3/2020</a:t>
             </a:fld>
             <a:endParaRPr lang="en-SG"/>
           </a:p>
@@ -1550,7 +1550,7 @@
           <a:p>
             <a:fld id="{2C94F50C-06F8-4A2E-ABC3-4E06C1913EFD}" type="datetimeFigureOut">
               <a:rPr lang="en-SG" smtClean="0"/>
-              <a:t>17/3/2020</a:t>
+              <a:t>18/3/2020</a:t>
             </a:fld>
             <a:endParaRPr lang="en-SG"/>
           </a:p>
@@ -2126,7 +2126,7 @@
           <a:p>
             <a:fld id="{2C94F50C-06F8-4A2E-ABC3-4E06C1913EFD}" type="datetimeFigureOut">
               <a:rPr lang="en-SG" smtClean="0"/>
-              <a:t>17/3/2020</a:t>
+              <a:t>18/3/2020</a:t>
             </a:fld>
             <a:endParaRPr lang="en-SG"/>
           </a:p>
@@ -2458,7 +2458,7 @@
           <a:p>
             <a:fld id="{2C94F50C-06F8-4A2E-ABC3-4E06C1913EFD}" type="datetimeFigureOut">
               <a:rPr lang="en-SG" smtClean="0"/>
-              <a:t>17/3/2020</a:t>
+              <a:t>18/3/2020</a:t>
             </a:fld>
             <a:endParaRPr lang="en-SG"/>
           </a:p>
@@ -2633,7 +2633,7 @@
           <a:p>
             <a:fld id="{2C94F50C-06F8-4A2E-ABC3-4E06C1913EFD}" type="datetimeFigureOut">
               <a:rPr lang="en-SG" smtClean="0"/>
-              <a:t>17/3/2020</a:t>
+              <a:t>18/3/2020</a:t>
             </a:fld>
             <a:endParaRPr lang="en-SG"/>
           </a:p>
@@ -2813,7 +2813,7 @@
           <a:p>
             <a:fld id="{2C94F50C-06F8-4A2E-ABC3-4E06C1913EFD}" type="datetimeFigureOut">
               <a:rPr lang="en-SG" smtClean="0"/>
-              <a:t>17/3/2020</a:t>
+              <a:t>18/3/2020</a:t>
             </a:fld>
             <a:endParaRPr lang="en-SG"/>
           </a:p>
@@ -2988,7 +2988,7 @@
           <a:p>
             <a:fld id="{2C94F50C-06F8-4A2E-ABC3-4E06C1913EFD}" type="datetimeFigureOut">
               <a:rPr lang="en-SG" smtClean="0"/>
-              <a:t>17/3/2020</a:t>
+              <a:t>18/3/2020</a:t>
             </a:fld>
             <a:endParaRPr lang="en-SG"/>
           </a:p>
@@ -3245,7 +3245,7 @@
           <a:p>
             <a:fld id="{2C94F50C-06F8-4A2E-ABC3-4E06C1913EFD}" type="datetimeFigureOut">
               <a:rPr lang="en-SG" smtClean="0"/>
-              <a:t>17/3/2020</a:t>
+              <a:t>18/3/2020</a:t>
             </a:fld>
             <a:endParaRPr lang="en-SG"/>
           </a:p>
@@ -3542,7 +3542,7 @@
           <a:p>
             <a:fld id="{2C94F50C-06F8-4A2E-ABC3-4E06C1913EFD}" type="datetimeFigureOut">
               <a:rPr lang="en-SG" smtClean="0"/>
-              <a:t>17/3/2020</a:t>
+              <a:t>18/3/2020</a:t>
             </a:fld>
             <a:endParaRPr lang="en-SG"/>
           </a:p>
@@ -3972,7 +3972,7 @@
           <a:p>
             <a:fld id="{2C94F50C-06F8-4A2E-ABC3-4E06C1913EFD}" type="datetimeFigureOut">
               <a:rPr lang="en-SG" smtClean="0"/>
-              <a:t>17/3/2020</a:t>
+              <a:t>18/3/2020</a:t>
             </a:fld>
             <a:endParaRPr lang="en-SG"/>
           </a:p>
@@ -4090,7 +4090,7 @@
           <a:p>
             <a:fld id="{2C94F50C-06F8-4A2E-ABC3-4E06C1913EFD}" type="datetimeFigureOut">
               <a:rPr lang="en-SG" smtClean="0"/>
-              <a:t>17/3/2020</a:t>
+              <a:t>18/3/2020</a:t>
             </a:fld>
             <a:endParaRPr lang="en-SG"/>
           </a:p>
@@ -4185,7 +4185,7 @@
           <a:p>
             <a:fld id="{2C94F50C-06F8-4A2E-ABC3-4E06C1913EFD}" type="datetimeFigureOut">
               <a:rPr lang="en-SG" smtClean="0"/>
-              <a:t>17/3/2020</a:t>
+              <a:t>18/3/2020</a:t>
             </a:fld>
             <a:endParaRPr lang="en-SG"/>
           </a:p>
@@ -4468,7 +4468,7 @@
           <a:p>
             <a:fld id="{2C94F50C-06F8-4A2E-ABC3-4E06C1913EFD}" type="datetimeFigureOut">
               <a:rPr lang="en-SG" smtClean="0"/>
-              <a:t>17/3/2020</a:t>
+              <a:t>18/3/2020</a:t>
             </a:fld>
             <a:endParaRPr lang="en-SG"/>
           </a:p>
@@ -4759,7 +4759,7 @@
           <a:p>
             <a:fld id="{2C94F50C-06F8-4A2E-ABC3-4E06C1913EFD}" type="datetimeFigureOut">
               <a:rPr lang="en-SG" smtClean="0"/>
-              <a:t>17/3/2020</a:t>
+              <a:t>18/3/2020</a:t>
             </a:fld>
             <a:endParaRPr lang="en-SG"/>
           </a:p>
@@ -4990,7 +4990,7 @@
           <a:p>
             <a:fld id="{2C94F50C-06F8-4A2E-ABC3-4E06C1913EFD}" type="datetimeFigureOut">
               <a:rPr lang="en-SG" smtClean="0"/>
-              <a:t>17/3/2020</a:t>
+              <a:t>18/3/2020</a:t>
             </a:fld>
             <a:endParaRPr lang="en-SG"/>
           </a:p>
@@ -6396,7 +6396,7 @@
           <a:p>
             <a:r>
               <a:rPr lang="en-US" dirty="0"/>
-              <a:t>Algorithm to find the sum of two numbers</a:t>
+              <a:t>pseudocode to find the sum of two numbers</a:t>
             </a:r>
           </a:p>
           <a:p>
@@ -6648,7 +6648,7 @@
           <a:p>
             <a:r>
               <a:rPr lang="en-US" dirty="0"/>
-              <a:t>Algorithm to find the smallest of two numbers</a:t>
+              <a:t>pseudocode to find the smallest of two numbers</a:t>
             </a:r>
           </a:p>
           <a:p>
@@ -6966,7 +6966,7 @@
           <a:p>
             <a:r>
               <a:rPr lang="en-US" dirty="0"/>
-              <a:t>Algorithm to find Even number between 1 to 50</a:t>
+              <a:t>pseudocode to find Even number between 1 to 50</a:t>
             </a:r>
           </a:p>
           <a:p>
@@ -7637,7 +7637,7 @@
                 </a:r>
                 <a:r>
                   <a:rPr lang="en-US" dirty="0"/>
-                  <a:t>Algorithm to convert temperature from Celsius to Fahrenheit</a:t>
+                  <a:t>pseudocode to convert temperature from Celsius to Fahrenheit</a:t>
                 </a:r>
               </a:p>
               <a:p>
@@ -7831,7 +7831,7 @@
             </a:r>
             <a:r>
               <a:rPr lang="en-US" dirty="0"/>
-              <a:t>Algorithm to find the largest of two numbers</a:t>
+              <a:t>pseudocode to find the largest of two numbers</a:t>
             </a:r>
           </a:p>
         </p:txBody>
@@ -7921,7 +7921,7 @@
             </a:r>
             <a:r>
               <a:rPr lang="en-US" dirty="0"/>
-              <a:t>Algorithm to find the largest of three numbers</a:t>
+              <a:t>pseudocode to find the largest of three numbers</a:t>
             </a:r>
           </a:p>
         </p:txBody>
@@ -8013,7 +8013,7 @@
                 </a:r>
                 <a:r>
                   <a:rPr lang="en-US" dirty="0"/>
-                  <a:t>Algorithm to find sum of series </a:t>
+                  <a:t>pseudocode to find sum of series </a:t>
                 </a:r>
                 <a14:m>
                   <m:oMath xmlns:m="http://schemas.openxmlformats.org/officeDocument/2006/math">
@@ -8261,7 +8261,7 @@
                 </a:r>
                 <a:r>
                   <a:rPr lang="en-US" dirty="0"/>
-                  <a:t>Algorithm to find sum of series </a:t>
+                  <a:t>pseudocode to find sum of series </a:t>
                 </a:r>
                 <a14:m>
                   <m:oMath xmlns:m="http://schemas.openxmlformats.org/officeDocument/2006/math">
@@ -8428,7 +8428,7 @@
                 </a:r>
                 <a:r>
                   <a:rPr lang="en-US" dirty="0"/>
-                  <a:t>Algorithm to find sum of series </a:t>
+                  <a:t>pseudocode to find sum of series </a:t>
                 </a:r>
                 <a14:m>
                   <m:oMath xmlns:m="http://schemas.openxmlformats.org/officeDocument/2006/math">

</xml_diff>

<commit_message>
back to campus commit
</commit_message>
<xml_diff>
--- a/SPRING 20/CSE 101/Course Materials/algo_pseudo_flowcharts_part3.pptx
+++ b/SPRING 20/CSE 101/Course Materials/algo_pseudo_flowcharts_part3.pptx
@@ -346,7 +346,7 @@
           <a:p>
             <a:fld id="{2C94F50C-06F8-4A2E-ABC3-4E06C1913EFD}" type="datetimeFigureOut">
               <a:rPr lang="en-SG" smtClean="0"/>
-              <a:t>18/3/2020</a:t>
+              <a:t>30/3/2020</a:t>
             </a:fld>
             <a:endParaRPr lang="en-SG"/>
           </a:p>
@@ -642,7 +642,7 @@
           <a:p>
             <a:fld id="{2C94F50C-06F8-4A2E-ABC3-4E06C1913EFD}" type="datetimeFigureOut">
               <a:rPr lang="en-SG" smtClean="0"/>
-              <a:t>18/3/2020</a:t>
+              <a:t>30/3/2020</a:t>
             </a:fld>
             <a:endParaRPr lang="en-SG"/>
           </a:p>
@@ -901,7 +901,7 @@
           <a:p>
             <a:fld id="{2C94F50C-06F8-4A2E-ABC3-4E06C1913EFD}" type="datetimeFigureOut">
               <a:rPr lang="en-SG" smtClean="0"/>
-              <a:t>18/3/2020</a:t>
+              <a:t>30/3/2020</a:t>
             </a:fld>
             <a:endParaRPr lang="en-SG"/>
           </a:p>
@@ -1370,7 +1370,7 @@
           <a:p>
             <a:fld id="{2C94F50C-06F8-4A2E-ABC3-4E06C1913EFD}" type="datetimeFigureOut">
               <a:rPr lang="en-SG" smtClean="0"/>
-              <a:t>18/3/2020</a:t>
+              <a:t>30/3/2020</a:t>
             </a:fld>
             <a:endParaRPr lang="en-SG"/>
           </a:p>
@@ -1550,7 +1550,7 @@
           <a:p>
             <a:fld id="{2C94F50C-06F8-4A2E-ABC3-4E06C1913EFD}" type="datetimeFigureOut">
               <a:rPr lang="en-SG" smtClean="0"/>
-              <a:t>18/3/2020</a:t>
+              <a:t>30/3/2020</a:t>
             </a:fld>
             <a:endParaRPr lang="en-SG"/>
           </a:p>
@@ -2126,7 +2126,7 @@
           <a:p>
             <a:fld id="{2C94F50C-06F8-4A2E-ABC3-4E06C1913EFD}" type="datetimeFigureOut">
               <a:rPr lang="en-SG" smtClean="0"/>
-              <a:t>18/3/2020</a:t>
+              <a:t>30/3/2020</a:t>
             </a:fld>
             <a:endParaRPr lang="en-SG"/>
           </a:p>
@@ -2458,7 +2458,7 @@
           <a:p>
             <a:fld id="{2C94F50C-06F8-4A2E-ABC3-4E06C1913EFD}" type="datetimeFigureOut">
               <a:rPr lang="en-SG" smtClean="0"/>
-              <a:t>18/3/2020</a:t>
+              <a:t>30/3/2020</a:t>
             </a:fld>
             <a:endParaRPr lang="en-SG"/>
           </a:p>
@@ -2633,7 +2633,7 @@
           <a:p>
             <a:fld id="{2C94F50C-06F8-4A2E-ABC3-4E06C1913EFD}" type="datetimeFigureOut">
               <a:rPr lang="en-SG" smtClean="0"/>
-              <a:t>18/3/2020</a:t>
+              <a:t>30/3/2020</a:t>
             </a:fld>
             <a:endParaRPr lang="en-SG"/>
           </a:p>
@@ -2813,7 +2813,7 @@
           <a:p>
             <a:fld id="{2C94F50C-06F8-4A2E-ABC3-4E06C1913EFD}" type="datetimeFigureOut">
               <a:rPr lang="en-SG" smtClean="0"/>
-              <a:t>18/3/2020</a:t>
+              <a:t>30/3/2020</a:t>
             </a:fld>
             <a:endParaRPr lang="en-SG"/>
           </a:p>
@@ -2988,7 +2988,7 @@
           <a:p>
             <a:fld id="{2C94F50C-06F8-4A2E-ABC3-4E06C1913EFD}" type="datetimeFigureOut">
               <a:rPr lang="en-SG" smtClean="0"/>
-              <a:t>18/3/2020</a:t>
+              <a:t>30/3/2020</a:t>
             </a:fld>
             <a:endParaRPr lang="en-SG"/>
           </a:p>
@@ -3245,7 +3245,7 @@
           <a:p>
             <a:fld id="{2C94F50C-06F8-4A2E-ABC3-4E06C1913EFD}" type="datetimeFigureOut">
               <a:rPr lang="en-SG" smtClean="0"/>
-              <a:t>18/3/2020</a:t>
+              <a:t>30/3/2020</a:t>
             </a:fld>
             <a:endParaRPr lang="en-SG"/>
           </a:p>
@@ -3542,7 +3542,7 @@
           <a:p>
             <a:fld id="{2C94F50C-06F8-4A2E-ABC3-4E06C1913EFD}" type="datetimeFigureOut">
               <a:rPr lang="en-SG" smtClean="0"/>
-              <a:t>18/3/2020</a:t>
+              <a:t>30/3/2020</a:t>
             </a:fld>
             <a:endParaRPr lang="en-SG"/>
           </a:p>
@@ -3972,7 +3972,7 @@
           <a:p>
             <a:fld id="{2C94F50C-06F8-4A2E-ABC3-4E06C1913EFD}" type="datetimeFigureOut">
               <a:rPr lang="en-SG" smtClean="0"/>
-              <a:t>18/3/2020</a:t>
+              <a:t>30/3/2020</a:t>
             </a:fld>
             <a:endParaRPr lang="en-SG"/>
           </a:p>
@@ -4090,7 +4090,7 @@
           <a:p>
             <a:fld id="{2C94F50C-06F8-4A2E-ABC3-4E06C1913EFD}" type="datetimeFigureOut">
               <a:rPr lang="en-SG" smtClean="0"/>
-              <a:t>18/3/2020</a:t>
+              <a:t>30/3/2020</a:t>
             </a:fld>
             <a:endParaRPr lang="en-SG"/>
           </a:p>
@@ -4185,7 +4185,7 @@
           <a:p>
             <a:fld id="{2C94F50C-06F8-4A2E-ABC3-4E06C1913EFD}" type="datetimeFigureOut">
               <a:rPr lang="en-SG" smtClean="0"/>
-              <a:t>18/3/2020</a:t>
+              <a:t>30/3/2020</a:t>
             </a:fld>
             <a:endParaRPr lang="en-SG"/>
           </a:p>
@@ -4468,7 +4468,7 @@
           <a:p>
             <a:fld id="{2C94F50C-06F8-4A2E-ABC3-4E06C1913EFD}" type="datetimeFigureOut">
               <a:rPr lang="en-SG" smtClean="0"/>
-              <a:t>18/3/2020</a:t>
+              <a:t>30/3/2020</a:t>
             </a:fld>
             <a:endParaRPr lang="en-SG"/>
           </a:p>
@@ -4759,7 +4759,7 @@
           <a:p>
             <a:fld id="{2C94F50C-06F8-4A2E-ABC3-4E06C1913EFD}" type="datetimeFigureOut">
               <a:rPr lang="en-SG" smtClean="0"/>
-              <a:t>18/3/2020</a:t>
+              <a:t>30/3/2020</a:t>
             </a:fld>
             <a:endParaRPr lang="en-SG"/>
           </a:p>
@@ -4990,7 +4990,7 @@
           <a:p>
             <a:fld id="{2C94F50C-06F8-4A2E-ABC3-4E06C1913EFD}" type="datetimeFigureOut">
               <a:rPr lang="en-SG" smtClean="0"/>
-              <a:t>18/3/2020</a:t>
+              <a:t>30/3/2020</a:t>
             </a:fld>
             <a:endParaRPr lang="en-SG"/>
           </a:p>
@@ -7015,7 +7015,7 @@
         </p:nvSpPr>
         <p:spPr>
           <a:xfrm>
-            <a:off x="1141413" y="2414849"/>
+            <a:off x="1141411" y="2823376"/>
             <a:ext cx="4536489" cy="1754326"/>
           </a:xfrm>
           <a:prstGeom prst="rect">
@@ -7210,7 +7210,7 @@
         </p:nvSpPr>
         <p:spPr>
           <a:xfrm>
-            <a:off x="6094412" y="2413337"/>
+            <a:off x="6094411" y="2684877"/>
             <a:ext cx="4536489" cy="2031325"/>
           </a:xfrm>
           <a:prstGeom prst="rect">
@@ -7428,7 +7428,7 @@
         </p:nvSpPr>
         <p:spPr>
           <a:xfrm>
-            <a:off x="3826167" y="4581525"/>
+            <a:off x="3826167" y="5343434"/>
             <a:ext cx="4536489" cy="1200329"/>
           </a:xfrm>
           <a:prstGeom prst="rect">

</xml_diff>